<commit_message>
Atualização da Proto Persona
</commit_message>
<xml_diff>
--- a/Documentação/ProtoPersona.pptx
+++ b/Documentação/ProtoPersona.pptx
@@ -259,7 +259,7 @@
           <a:p>
             <a:fld id="{75EA822D-EC7F-445D-B4B2-1D8BFE09073C}" type="datetimeFigureOut">
               <a:rPr lang="pt-BR" smtClean="0"/>
-              <a:t>03/09/2020</a:t>
+              <a:t>04/09/2020</a:t>
             </a:fld>
             <a:endParaRPr lang="pt-BR"/>
           </a:p>
@@ -457,7 +457,7 @@
           <a:p>
             <a:fld id="{75EA822D-EC7F-445D-B4B2-1D8BFE09073C}" type="datetimeFigureOut">
               <a:rPr lang="pt-BR" smtClean="0"/>
-              <a:t>03/09/2020</a:t>
+              <a:t>04/09/2020</a:t>
             </a:fld>
             <a:endParaRPr lang="pt-BR"/>
           </a:p>
@@ -665,7 +665,7 @@
           <a:p>
             <a:fld id="{75EA822D-EC7F-445D-B4B2-1D8BFE09073C}" type="datetimeFigureOut">
               <a:rPr lang="pt-BR" smtClean="0"/>
-              <a:t>03/09/2020</a:t>
+              <a:t>04/09/2020</a:t>
             </a:fld>
             <a:endParaRPr lang="pt-BR"/>
           </a:p>
@@ -863,7 +863,7 @@
           <a:p>
             <a:fld id="{75EA822D-EC7F-445D-B4B2-1D8BFE09073C}" type="datetimeFigureOut">
               <a:rPr lang="pt-BR" smtClean="0"/>
-              <a:t>03/09/2020</a:t>
+              <a:t>04/09/2020</a:t>
             </a:fld>
             <a:endParaRPr lang="pt-BR"/>
           </a:p>
@@ -1138,7 +1138,7 @@
           <a:p>
             <a:fld id="{75EA822D-EC7F-445D-B4B2-1D8BFE09073C}" type="datetimeFigureOut">
               <a:rPr lang="pt-BR" smtClean="0"/>
-              <a:t>03/09/2020</a:t>
+              <a:t>04/09/2020</a:t>
             </a:fld>
             <a:endParaRPr lang="pt-BR"/>
           </a:p>
@@ -1403,7 +1403,7 @@
           <a:p>
             <a:fld id="{75EA822D-EC7F-445D-B4B2-1D8BFE09073C}" type="datetimeFigureOut">
               <a:rPr lang="pt-BR" smtClean="0"/>
-              <a:t>03/09/2020</a:t>
+              <a:t>04/09/2020</a:t>
             </a:fld>
             <a:endParaRPr lang="pt-BR"/>
           </a:p>
@@ -1815,7 +1815,7 @@
           <a:p>
             <a:fld id="{75EA822D-EC7F-445D-B4B2-1D8BFE09073C}" type="datetimeFigureOut">
               <a:rPr lang="pt-BR" smtClean="0"/>
-              <a:t>03/09/2020</a:t>
+              <a:t>04/09/2020</a:t>
             </a:fld>
             <a:endParaRPr lang="pt-BR"/>
           </a:p>
@@ -1956,7 +1956,7 @@
           <a:p>
             <a:fld id="{75EA822D-EC7F-445D-B4B2-1D8BFE09073C}" type="datetimeFigureOut">
               <a:rPr lang="pt-BR" smtClean="0"/>
-              <a:t>03/09/2020</a:t>
+              <a:t>04/09/2020</a:t>
             </a:fld>
             <a:endParaRPr lang="pt-BR"/>
           </a:p>
@@ -2069,7 +2069,7 @@
           <a:p>
             <a:fld id="{75EA822D-EC7F-445D-B4B2-1D8BFE09073C}" type="datetimeFigureOut">
               <a:rPr lang="pt-BR" smtClean="0"/>
-              <a:t>03/09/2020</a:t>
+              <a:t>04/09/2020</a:t>
             </a:fld>
             <a:endParaRPr lang="pt-BR"/>
           </a:p>
@@ -2380,7 +2380,7 @@
           <a:p>
             <a:fld id="{75EA822D-EC7F-445D-B4B2-1D8BFE09073C}" type="datetimeFigureOut">
               <a:rPr lang="pt-BR" smtClean="0"/>
-              <a:t>03/09/2020</a:t>
+              <a:t>04/09/2020</a:t>
             </a:fld>
             <a:endParaRPr lang="pt-BR"/>
           </a:p>
@@ -2668,7 +2668,7 @@
           <a:p>
             <a:fld id="{75EA822D-EC7F-445D-B4B2-1D8BFE09073C}" type="datetimeFigureOut">
               <a:rPr lang="pt-BR" smtClean="0"/>
-              <a:t>03/09/2020</a:t>
+              <a:t>04/09/2020</a:t>
             </a:fld>
             <a:endParaRPr lang="pt-BR"/>
           </a:p>
@@ -2909,7 +2909,7 @@
           <a:p>
             <a:fld id="{75EA822D-EC7F-445D-B4B2-1D8BFE09073C}" type="datetimeFigureOut">
               <a:rPr lang="pt-BR" smtClean="0"/>
-              <a:t>03/09/2020</a:t>
+              <a:t>04/09/2020</a:t>
             </a:fld>
             <a:endParaRPr lang="pt-BR"/>
           </a:p>
@@ -3780,7 +3780,7 @@
                 <a:latin typeface="Arial" panose="020B0604020202020204" pitchFamily="34" charset="0"/>
                 <a:cs typeface="Arial" panose="020B0604020202020204" pitchFamily="34" charset="0"/>
               </a:rPr>
-              <a:t>Gênero masculino;</a:t>
+              <a:t>Formado na área de TI;</a:t>
             </a:r>
           </a:p>
           <a:p>
@@ -3796,7 +3796,7 @@
                 <a:latin typeface="Arial" panose="020B0604020202020204" pitchFamily="34" charset="0"/>
                 <a:cs typeface="Arial" panose="020B0604020202020204" pitchFamily="34" charset="0"/>
               </a:rPr>
-              <a:t>Média de 30 anos;</a:t>
+              <a:t>Trabalha como suporte técnico;</a:t>
             </a:r>
           </a:p>
           <a:p>
@@ -3812,7 +3812,21 @@
                 <a:latin typeface="Arial" panose="020B0604020202020204" pitchFamily="34" charset="0"/>
                 <a:cs typeface="Arial" panose="020B0604020202020204" pitchFamily="34" charset="0"/>
               </a:rPr>
-              <a:t>Formado na área de TI;</a:t>
+              <a:t>Trabalha no segmento de </a:t>
+            </a:r>
+            <a:r>
+              <a:rPr lang="pt-BR" sz="1600" dirty="0" err="1">
+                <a:latin typeface="Arial" panose="020B0604020202020204" pitchFamily="34" charset="0"/>
+                <a:cs typeface="Arial" panose="020B0604020202020204" pitchFamily="34" charset="0"/>
+              </a:rPr>
+              <a:t>call</a:t>
+            </a:r>
+            <a:r>
+              <a:rPr lang="pt-BR" sz="1600" dirty="0">
+                <a:latin typeface="Arial" panose="020B0604020202020204" pitchFamily="34" charset="0"/>
+                <a:cs typeface="Arial" panose="020B0604020202020204" pitchFamily="34" charset="0"/>
+              </a:rPr>
+              <a:t> center;</a:t>
             </a:r>
           </a:p>
           <a:p>
@@ -3828,7 +3842,7 @@
                 <a:latin typeface="Arial" panose="020B0604020202020204" pitchFamily="34" charset="0"/>
                 <a:cs typeface="Arial" panose="020B0604020202020204" pitchFamily="34" charset="0"/>
               </a:rPr>
-              <a:t>Trabalha como suporte técnico;</a:t>
+              <a:t>Possui uma boa habilidade analítica;</a:t>
             </a:r>
           </a:p>
           <a:p>
@@ -3839,27 +3853,10 @@
               <a:buFont typeface="Wingdings" panose="05000000000000000000" pitchFamily="2" charset="2"/>
               <a:buChar char="§"/>
             </a:pPr>
-            <a:r>
-              <a:rPr lang="pt-BR" sz="1600" dirty="0">
-                <a:latin typeface="Arial" panose="020B0604020202020204" pitchFamily="34" charset="0"/>
-                <a:cs typeface="Arial" panose="020B0604020202020204" pitchFamily="34" charset="0"/>
-              </a:rPr>
-              <a:t>Trabalha no segmento de </a:t>
-            </a:r>
-            <a:r>
-              <a:rPr lang="pt-BR" sz="1600" dirty="0" err="1">
-                <a:latin typeface="Arial" panose="020B0604020202020204" pitchFamily="34" charset="0"/>
-                <a:cs typeface="Arial" panose="020B0604020202020204" pitchFamily="34" charset="0"/>
-              </a:rPr>
-              <a:t>call</a:t>
-            </a:r>
-            <a:r>
-              <a:rPr lang="pt-BR" sz="1600" dirty="0">
-                <a:latin typeface="Arial" panose="020B0604020202020204" pitchFamily="34" charset="0"/>
-                <a:cs typeface="Arial" panose="020B0604020202020204" pitchFamily="34" charset="0"/>
-              </a:rPr>
-              <a:t> center;</a:t>
-            </a:r>
+            <a:endParaRPr lang="pt-BR" sz="1600" dirty="0">
+              <a:latin typeface="Arial" panose="020B0604020202020204" pitchFamily="34" charset="0"/>
+              <a:cs typeface="Arial" panose="020B0604020202020204" pitchFamily="34" charset="0"/>
+            </a:endParaRPr>
           </a:p>
         </p:txBody>
       </p:sp>
@@ -3878,7 +3875,7 @@
         <p:spPr>
           <a:xfrm>
             <a:off x="1056443" y="4346019"/>
-            <a:ext cx="6400800" cy="1524007"/>
+            <a:ext cx="10373558" cy="2262671"/>
           </a:xfrm>
           <a:prstGeom prst="rect">
             <a:avLst/>
@@ -3952,6 +3949,38 @@
                 <a:cs typeface="Arial" panose="020B0604020202020204" pitchFamily="34" charset="0"/>
               </a:rPr>
               <a:t>Realizar o reparo das máquinas;</a:t>
+            </a:r>
+          </a:p>
+          <a:p>
+            <a:pPr marL="285750" indent="-285750">
+              <a:lnSpc>
+                <a:spcPct val="150000"/>
+              </a:lnSpc>
+              <a:buFont typeface="Wingdings" panose="05000000000000000000" pitchFamily="2" charset="2"/>
+              <a:buChar char="§"/>
+            </a:pPr>
+            <a:r>
+              <a:rPr lang="pt-BR" sz="1600" dirty="0">
+                <a:latin typeface="Arial" panose="020B0604020202020204" pitchFamily="34" charset="0"/>
+                <a:cs typeface="Arial" panose="020B0604020202020204" pitchFamily="34" charset="0"/>
+              </a:rPr>
+              <a:t>Outros funcionários têm costume de solicitar um atendimento sem efetuar o registro da solicitação;</a:t>
+            </a:r>
+          </a:p>
+          <a:p>
+            <a:pPr marL="285750" indent="-285750">
+              <a:lnSpc>
+                <a:spcPct val="150000"/>
+              </a:lnSpc>
+              <a:buFont typeface="Wingdings" panose="05000000000000000000" pitchFamily="2" charset="2"/>
+              <a:buChar char="§"/>
+            </a:pPr>
+            <a:r>
+              <a:rPr lang="pt-BR" sz="1600" dirty="0">
+                <a:latin typeface="Arial" panose="020B0604020202020204" pitchFamily="34" charset="0"/>
+                <a:cs typeface="Arial" panose="020B0604020202020204" pitchFamily="34" charset="0"/>
+              </a:rPr>
+              <a:t>Processo de atendimento definido.</a:t>
             </a:r>
           </a:p>
         </p:txBody>

</xml_diff>

<commit_message>
Criação da justificativa do projeto
</commit_message>
<xml_diff>
--- a/Documentação/ProtoPersona.pptx
+++ b/Documentação/ProtoPersona.pptx
@@ -3842,8 +3842,19 @@
                 <a:latin typeface="Arial" panose="020B0604020202020204" pitchFamily="34" charset="0"/>
                 <a:cs typeface="Arial" panose="020B0604020202020204" pitchFamily="34" charset="0"/>
               </a:rPr>
-              <a:t>Possui uma boa habilidade analítica;</a:t>
-            </a:r>
+              <a:t>Possui uma boa </a:t>
+            </a:r>
+            <a:r>
+              <a:rPr lang="pt-BR" sz="1600">
+                <a:latin typeface="Arial" panose="020B0604020202020204" pitchFamily="34" charset="0"/>
+                <a:cs typeface="Arial" panose="020B0604020202020204" pitchFamily="34" charset="0"/>
+              </a:rPr>
+              <a:t>habilidade analítica.</a:t>
+            </a:r>
+            <a:endParaRPr lang="pt-BR" sz="1600" dirty="0">
+              <a:latin typeface="Arial" panose="020B0604020202020204" pitchFamily="34" charset="0"/>
+              <a:cs typeface="Arial" panose="020B0604020202020204" pitchFamily="34" charset="0"/>
+            </a:endParaRPr>
           </a:p>
           <a:p>
             <a:pPr marL="285750" indent="-285750">

</xml_diff>

<commit_message>
correção de um mini erro na protopersona
</commit_message>
<xml_diff>
--- a/Documentação/ProtoPersona.pptx
+++ b/Documentação/ProtoPersona.pptx
@@ -260,7 +260,7 @@
           <a:p>
             <a:fld id="{75EA822D-EC7F-445D-B4B2-1D8BFE09073C}" type="datetimeFigureOut">
               <a:rPr lang="pt-BR" smtClean="0"/>
-              <a:t>10/09/2020</a:t>
+              <a:t>11/09/2020</a:t>
             </a:fld>
             <a:endParaRPr lang="pt-BR"/>
           </a:p>
@@ -458,7 +458,7 @@
           <a:p>
             <a:fld id="{75EA822D-EC7F-445D-B4B2-1D8BFE09073C}" type="datetimeFigureOut">
               <a:rPr lang="pt-BR" smtClean="0"/>
-              <a:t>10/09/2020</a:t>
+              <a:t>11/09/2020</a:t>
             </a:fld>
             <a:endParaRPr lang="pt-BR"/>
           </a:p>
@@ -666,7 +666,7 @@
           <a:p>
             <a:fld id="{75EA822D-EC7F-445D-B4B2-1D8BFE09073C}" type="datetimeFigureOut">
               <a:rPr lang="pt-BR" smtClean="0"/>
-              <a:t>10/09/2020</a:t>
+              <a:t>11/09/2020</a:t>
             </a:fld>
             <a:endParaRPr lang="pt-BR"/>
           </a:p>
@@ -864,7 +864,7 @@
           <a:p>
             <a:fld id="{75EA822D-EC7F-445D-B4B2-1D8BFE09073C}" type="datetimeFigureOut">
               <a:rPr lang="pt-BR" smtClean="0"/>
-              <a:t>10/09/2020</a:t>
+              <a:t>11/09/2020</a:t>
             </a:fld>
             <a:endParaRPr lang="pt-BR"/>
           </a:p>
@@ -1139,7 +1139,7 @@
           <a:p>
             <a:fld id="{75EA822D-EC7F-445D-B4B2-1D8BFE09073C}" type="datetimeFigureOut">
               <a:rPr lang="pt-BR" smtClean="0"/>
-              <a:t>10/09/2020</a:t>
+              <a:t>11/09/2020</a:t>
             </a:fld>
             <a:endParaRPr lang="pt-BR"/>
           </a:p>
@@ -1404,7 +1404,7 @@
           <a:p>
             <a:fld id="{75EA822D-EC7F-445D-B4B2-1D8BFE09073C}" type="datetimeFigureOut">
               <a:rPr lang="pt-BR" smtClean="0"/>
-              <a:t>10/09/2020</a:t>
+              <a:t>11/09/2020</a:t>
             </a:fld>
             <a:endParaRPr lang="pt-BR"/>
           </a:p>
@@ -1816,7 +1816,7 @@
           <a:p>
             <a:fld id="{75EA822D-EC7F-445D-B4B2-1D8BFE09073C}" type="datetimeFigureOut">
               <a:rPr lang="pt-BR" smtClean="0"/>
-              <a:t>10/09/2020</a:t>
+              <a:t>11/09/2020</a:t>
             </a:fld>
             <a:endParaRPr lang="pt-BR"/>
           </a:p>
@@ -1957,7 +1957,7 @@
           <a:p>
             <a:fld id="{75EA822D-EC7F-445D-B4B2-1D8BFE09073C}" type="datetimeFigureOut">
               <a:rPr lang="pt-BR" smtClean="0"/>
-              <a:t>10/09/2020</a:t>
+              <a:t>11/09/2020</a:t>
             </a:fld>
             <a:endParaRPr lang="pt-BR"/>
           </a:p>
@@ -2070,7 +2070,7 @@
           <a:p>
             <a:fld id="{75EA822D-EC7F-445D-B4B2-1D8BFE09073C}" type="datetimeFigureOut">
               <a:rPr lang="pt-BR" smtClean="0"/>
-              <a:t>10/09/2020</a:t>
+              <a:t>11/09/2020</a:t>
             </a:fld>
             <a:endParaRPr lang="pt-BR"/>
           </a:p>
@@ -2381,7 +2381,7 @@
           <a:p>
             <a:fld id="{75EA822D-EC7F-445D-B4B2-1D8BFE09073C}" type="datetimeFigureOut">
               <a:rPr lang="pt-BR" smtClean="0"/>
-              <a:t>10/09/2020</a:t>
+              <a:t>11/09/2020</a:t>
             </a:fld>
             <a:endParaRPr lang="pt-BR"/>
           </a:p>
@@ -2669,7 +2669,7 @@
           <a:p>
             <a:fld id="{75EA822D-EC7F-445D-B4B2-1D8BFE09073C}" type="datetimeFigureOut">
               <a:rPr lang="pt-BR" smtClean="0"/>
-              <a:t>10/09/2020</a:t>
+              <a:t>11/09/2020</a:t>
             </a:fld>
             <a:endParaRPr lang="pt-BR"/>
           </a:p>
@@ -2910,7 +2910,7 @@
           <a:p>
             <a:fld id="{75EA822D-EC7F-445D-B4B2-1D8BFE09073C}" type="datetimeFigureOut">
               <a:rPr lang="pt-BR" smtClean="0"/>
-              <a:t>10/09/2020</a:t>
+              <a:t>11/09/2020</a:t>
             </a:fld>
             <a:endParaRPr lang="pt-BR"/>
           </a:p>
@@ -4610,7 +4610,7 @@
                 <a:latin typeface="Arial" panose="020B0604020202020204" pitchFamily="34" charset="0"/>
                 <a:cs typeface="Arial" panose="020B0604020202020204" pitchFamily="34" charset="0"/>
               </a:rPr>
-              <a:t>Liderar uma equipe;</a:t>
+              <a:t>Liderar uma equipe.</a:t>
             </a:r>
           </a:p>
         </p:txBody>

</xml_diff>